<commit_message>
[add] complete lecture 14
</commit_message>
<xml_diff>
--- a/SE-227/slides/CSE-14 All-or-Nothing.pptx
+++ b/SE-227/slides/CSE-14 All-or-Nothing.pptx
@@ -277,7 +277,7 @@
           <a:p>
             <a:fld id="{FD384E5B-0B7C-A143-A087-04B582FC4BEF}" type="datetimeFigureOut">
               <a:rPr kumimoji="1" lang="zh-CN" altLang="en-US" smtClean="0"/>
-              <a:t>2019/10/31</a:t>
+              <a:t>2019/12/22</a:t>
             </a:fld>
             <a:endParaRPr kumimoji="1" lang="zh-CN" altLang="en-US"/>
           </a:p>
@@ -442,7 +442,7 @@
           <a:p>
             <a:fld id="{A2D7DB94-E0DE-4F0F-A9B7-54654CD8C8B1}" type="datetimeFigureOut">
               <a:rPr lang="zh-CN" altLang="en-US" smtClean="0"/>
-              <a:t>2019/10/31</a:t>
+              <a:t>2019/12/22</a:t>
             </a:fld>
             <a:endParaRPr lang="zh-CN" altLang="en-US"/>
           </a:p>
@@ -891,29 +891,14 @@
           <a:bodyPr/>
           <a:lstStyle/>
           <a:p>
-            <a:pPr marL="0" marR="0" indent="0" algn="l" defTabSz="914400" rtl="0" eaLnBrk="1" fontAlgn="auto" latinLnBrk="0" hangingPunct="1">
-              <a:lnSpc>
-                <a:spcPct val="100000"/>
-              </a:lnSpc>
-              <a:spcBef>
-                <a:spcPts val="0"/>
-              </a:spcBef>
-              <a:spcAft>
-                <a:spcPts val="0"/>
-              </a:spcAft>
-              <a:buClrTx/>
-              <a:buSzTx/>
-              <a:buFontTx/>
-              <a:buNone/>
-              <a:tabLst/>
-              <a:defRPr/>
-            </a:pPr>
             <a:r>
               <a:rPr lang="en-US" dirty="0"/>
-              <a:t>Logging: only record the delta.</a:t>
-            </a:r>
-          </a:p>
-          <a:p>
+              <a:t>not</a:t>
+            </a:r>
+            <a:r>
+              <a:rPr lang="en-US" baseline="0" dirty="0"/>
+              <a:t> everything can be a transaction.</a:t>
+            </a:r>
             <a:endParaRPr lang="en-US" dirty="0"/>
           </a:p>
         </p:txBody>
@@ -935,7 +920,7 @@
           <a:p>
             <a:fld id="{CF5B8B3F-0F45-4AAD-B4A8-B1F7D58CB493}" type="slidenum">
               <a:rPr lang="zh-CN" altLang="en-US" smtClean="0"/>
-              <a:t>39</a:t>
+              <a:t>38</a:t>
             </a:fld>
             <a:endParaRPr lang="zh-CN" altLang="en-US"/>
           </a:p>
@@ -944,7 +929,7 @@
     </p:spTree>
     <p:extLst>
       <p:ext uri="{BB962C8B-B14F-4D97-AF65-F5344CB8AC3E}">
-        <p14:creationId xmlns:p14="http://schemas.microsoft.com/office/powerpoint/2010/main" val="3224306692"/>
+        <p14:creationId xmlns:p14="http://schemas.microsoft.com/office/powerpoint/2010/main" val="943306724"/>
       </p:ext>
     </p:extLst>
   </p:cSld>
@@ -998,6 +983,29 @@
           <a:bodyPr/>
           <a:lstStyle/>
           <a:p>
+            <a:pPr marL="0" marR="0" indent="0" algn="l" defTabSz="914400" rtl="0" eaLnBrk="1" fontAlgn="auto" latinLnBrk="0" hangingPunct="1">
+              <a:lnSpc>
+                <a:spcPct val="100000"/>
+              </a:lnSpc>
+              <a:spcBef>
+                <a:spcPts val="0"/>
+              </a:spcBef>
+              <a:spcAft>
+                <a:spcPts val="0"/>
+              </a:spcAft>
+              <a:buClrTx/>
+              <a:buSzTx/>
+              <a:buFontTx/>
+              <a:buNone/>
+              <a:tabLst/>
+              <a:defRPr/>
+            </a:pPr>
+            <a:r>
+              <a:rPr lang="en-US" dirty="0"/>
+              <a:t>Logging: only record the delta.</a:t>
+            </a:r>
+          </a:p>
+          <a:p>
             <a:endParaRPr lang="en-US" dirty="0"/>
           </a:p>
         </p:txBody>
@@ -1019,7 +1027,7 @@
           <a:p>
             <a:fld id="{CF5B8B3F-0F45-4AAD-B4A8-B1F7D58CB493}" type="slidenum">
               <a:rPr lang="zh-CN" altLang="en-US" smtClean="0"/>
-              <a:t>40</a:t>
+              <a:t>39</a:t>
             </a:fld>
             <a:endParaRPr lang="zh-CN" altLang="en-US"/>
           </a:p>
@@ -1028,7 +1036,7 @@
     </p:spTree>
     <p:extLst>
       <p:ext uri="{BB962C8B-B14F-4D97-AF65-F5344CB8AC3E}">
-        <p14:creationId xmlns:p14="http://schemas.microsoft.com/office/powerpoint/2010/main" val="2431071584"/>
+        <p14:creationId xmlns:p14="http://schemas.microsoft.com/office/powerpoint/2010/main" val="3224306692"/>
       </p:ext>
     </p:extLst>
   </p:cSld>
@@ -1082,19 +1090,7 @@
           <a:bodyPr/>
           <a:lstStyle/>
           <a:p>
-            <a:r>
-              <a:rPr lang="en-US" dirty="0"/>
-              <a:t>Q: Which is a commit point? </a:t>
-            </a:r>
-          </a:p>
-          <a:p>
             <a:endParaRPr lang="en-US" dirty="0"/>
-          </a:p>
-          <a:p>
-            <a:r>
-              <a:rPr lang="en-US" dirty="0"/>
-              <a:t>Assumption: writing a single disk block is atomic. A partially written record is ignored.</a:t>
-            </a:r>
           </a:p>
         </p:txBody>
       </p:sp>
@@ -1113,18 +1109,18 @@
           <a:bodyPr/>
           <a:lstStyle/>
           <a:p>
-            <a:fld id="{B965D5C0-63AC-FB45-A601-92C1112B2A7B}" type="slidenum">
-              <a:rPr lang="en-US" smtClean="0"/>
-              <a:t>43</a:t>
+            <a:fld id="{CF5B8B3F-0F45-4AAD-B4A8-B1F7D58CB493}" type="slidenum">
+              <a:rPr lang="zh-CN" altLang="en-US" smtClean="0"/>
+              <a:t>40</a:t>
             </a:fld>
-            <a:endParaRPr lang="en-US"/>
+            <a:endParaRPr lang="zh-CN" altLang="en-US"/>
           </a:p>
         </p:txBody>
       </p:sp>
     </p:spTree>
     <p:extLst>
       <p:ext uri="{BB962C8B-B14F-4D97-AF65-F5344CB8AC3E}">
-        <p14:creationId xmlns:p14="http://schemas.microsoft.com/office/powerpoint/2010/main" val="1671006687"/>
+        <p14:creationId xmlns:p14="http://schemas.microsoft.com/office/powerpoint/2010/main" val="2431071584"/>
       </p:ext>
     </p:extLst>
   </p:cSld>
@@ -1211,7 +1207,7 @@
           <a:p>
             <a:fld id="{B965D5C0-63AC-FB45-A601-92C1112B2A7B}" type="slidenum">
               <a:rPr lang="en-US" smtClean="0"/>
-              <a:t>44</a:t>
+              <a:t>43</a:t>
             </a:fld>
             <a:endParaRPr lang="en-US"/>
           </a:p>
@@ -1220,7 +1216,7 @@
     </p:spTree>
     <p:extLst>
       <p:ext uri="{BB962C8B-B14F-4D97-AF65-F5344CB8AC3E}">
-        <p14:creationId xmlns:p14="http://schemas.microsoft.com/office/powerpoint/2010/main" val="3302732898"/>
+        <p14:creationId xmlns:p14="http://schemas.microsoft.com/office/powerpoint/2010/main" val="1671006687"/>
       </p:ext>
     </p:extLst>
   </p:cSld>
@@ -1274,30 +1270,19 @@
           <a:bodyPr/>
           <a:lstStyle/>
           <a:p>
-            <a:pPr marL="0" marR="0" indent="0" algn="l" defTabSz="457200" rtl="0" eaLnBrk="1" fontAlgn="auto" latinLnBrk="0" hangingPunct="1">
-              <a:lnSpc>
-                <a:spcPct val="100000"/>
-              </a:lnSpc>
-              <a:spcBef>
-                <a:spcPts val="0"/>
-              </a:spcBef>
-              <a:spcAft>
-                <a:spcPts val="0"/>
-              </a:spcAft>
-              <a:buClrTx/>
-              <a:buSzTx/>
-              <a:buFontTx/>
-              <a:buNone/>
-              <a:tabLst/>
-              <a:defRPr/>
-            </a:pPr>
             <a:r>
               <a:rPr lang="en-US" dirty="0"/>
-              <a:t>    [ board: log, cell storage; updates going to both, read from cell storage ]</a:t>
+              <a:t>Q: Which is a commit point? </a:t>
             </a:r>
           </a:p>
           <a:p>
             <a:endParaRPr lang="en-US" dirty="0"/>
+          </a:p>
+          <a:p>
+            <a:r>
+              <a:rPr lang="en-US" dirty="0"/>
+              <a:t>Assumption: writing a single disk block is atomic. A partially written record is ignored.</a:t>
+            </a:r>
           </a:p>
         </p:txBody>
       </p:sp>
@@ -1318,7 +1303,7 @@
           <a:p>
             <a:fld id="{B965D5C0-63AC-FB45-A601-92C1112B2A7B}" type="slidenum">
               <a:rPr lang="en-US" smtClean="0"/>
-              <a:t>47</a:t>
+              <a:t>44</a:t>
             </a:fld>
             <a:endParaRPr lang="en-US"/>
           </a:p>
@@ -1327,7 +1312,7 @@
     </p:spTree>
     <p:extLst>
       <p:ext uri="{BB962C8B-B14F-4D97-AF65-F5344CB8AC3E}">
-        <p14:creationId xmlns:p14="http://schemas.microsoft.com/office/powerpoint/2010/main" val="3262575001"/>
+        <p14:creationId xmlns:p14="http://schemas.microsoft.com/office/powerpoint/2010/main" val="3302732898"/>
       </p:ext>
     </p:extLst>
   </p:cSld>
@@ -1356,7 +1341,7 @@
       </p:grpSpPr>
       <p:sp>
         <p:nvSpPr>
-          <p:cNvPr id="2" name="Slide Image Placeholder 1"/>
+          <p:cNvPr id="2" name="投影片影像版面配置區 1"/>
           <p:cNvSpPr>
             <a:spLocks noGrp="1" noRot="1" noChangeAspect="1"/>
           </p:cNvSpPr>
@@ -1368,7 +1353,7 @@
       </p:sp>
       <p:sp>
         <p:nvSpPr>
-          <p:cNvPr id="3" name="Notes Placeholder 2"/>
+          <p:cNvPr id="3" name="備忘稿版面配置區 2"/>
           <p:cNvSpPr>
             <a:spLocks noGrp="1"/>
           </p:cNvSpPr>
@@ -1381,162 +1366,18 @@
           <a:bodyPr/>
           <a:lstStyle/>
           <a:p>
-            <a:r>
-              <a:rPr lang="en-US" sz="1200" kern="1200" dirty="0">
-                <a:solidFill>
-                  <a:schemeClr val="tx1"/>
-                </a:solidFill>
-                <a:latin typeface="+mn-lt"/>
-                <a:ea typeface="+mn-ea"/>
-                <a:cs typeface="+mn-cs"/>
-              </a:rPr>
-              <a:t>Recovery? Crash between</a:t>
-            </a:r>
-            <a:r>
-              <a:rPr lang="en-US" sz="1200" kern="1200" baseline="0" dirty="0">
-                <a:solidFill>
-                  <a:schemeClr val="tx1"/>
-                </a:solidFill>
-                <a:latin typeface="+mn-lt"/>
-                <a:ea typeface="+mn-ea"/>
-                <a:cs typeface="+mn-cs"/>
-              </a:rPr>
-              <a:t> logging and installing.</a:t>
-            </a:r>
-            <a:endParaRPr lang="en-US" sz="1200" kern="1200" dirty="0">
-              <a:solidFill>
-                <a:schemeClr val="tx1"/>
-              </a:solidFill>
-              <a:latin typeface="+mn-lt"/>
-              <a:ea typeface="+mn-ea"/>
-              <a:cs typeface="+mn-cs"/>
-            </a:endParaRPr>
-          </a:p>
-          <a:p>
-            <a:r>
-              <a:rPr lang="en-US" sz="1200" kern="1200" dirty="0">
-                <a:solidFill>
-                  <a:schemeClr val="tx1"/>
-                </a:solidFill>
-                <a:latin typeface="+mn-lt"/>
-                <a:ea typeface="+mn-ea"/>
-                <a:cs typeface="+mn-cs"/>
-              </a:rPr>
-              <a:t>Write is not all-or-nothing!</a:t>
-            </a:r>
-            <a:r>
-              <a:rPr lang="en-US" sz="1200" kern="1200" baseline="0" dirty="0">
-                <a:solidFill>
-                  <a:schemeClr val="tx1"/>
-                </a:solidFill>
-                <a:latin typeface="+mn-lt"/>
-                <a:ea typeface="+mn-ea"/>
-                <a:cs typeface="+mn-cs"/>
-              </a:rPr>
-              <a:t> install value before commit? what if crash? Need to roll back to old value (which is saved in the log)</a:t>
-            </a:r>
-          </a:p>
-          <a:p>
-            <a:endParaRPr lang="en-US" sz="1200" kern="1200" dirty="0">
-              <a:solidFill>
-                <a:schemeClr val="tx1"/>
-              </a:solidFill>
-              <a:latin typeface="+mn-lt"/>
-              <a:ea typeface="+mn-ea"/>
-              <a:cs typeface="+mn-cs"/>
-            </a:endParaRPr>
-          </a:p>
-          <a:p>
-            <a:r>
-              <a:rPr lang="en-US" sz="1200" kern="1200" dirty="0">
-                <a:solidFill>
-                  <a:schemeClr val="tx1"/>
-                </a:solidFill>
-                <a:latin typeface="+mn-lt"/>
-                <a:ea typeface="+mn-ea"/>
-                <a:cs typeface="+mn-cs"/>
-              </a:rPr>
-              <a:t>  Log still contains the same things.</a:t>
-            </a:r>
-          </a:p>
-          <a:p>
-            <a:r>
-              <a:rPr lang="en-US" sz="1200" kern="1200" dirty="0">
-                <a:solidFill>
-                  <a:schemeClr val="tx1"/>
-                </a:solidFill>
-                <a:latin typeface="+mn-lt"/>
-                <a:ea typeface="+mn-ea"/>
-                <a:cs typeface="+mn-cs"/>
-              </a:rPr>
-              <a:t>  As we're running, maintain cell storage for A and B.</a:t>
-            </a:r>
-          </a:p>
-          <a:p>
-            <a:r>
-              <a:rPr lang="en-US" sz="1200" kern="1200" dirty="0">
-                <a:solidFill>
-                  <a:schemeClr val="tx1"/>
-                </a:solidFill>
-                <a:latin typeface="+mn-lt"/>
-                <a:ea typeface="+mn-ea"/>
-                <a:cs typeface="+mn-cs"/>
-              </a:rPr>
-              <a:t>  Except one problem: after crash, A's value in cell storage is wrong.</a:t>
-            </a:r>
-          </a:p>
-          <a:p>
-            <a:r>
-              <a:rPr lang="en-US" sz="1200" kern="1200" dirty="0">
-                <a:solidFill>
-                  <a:schemeClr val="tx1"/>
-                </a:solidFill>
-                <a:latin typeface="+mn-lt"/>
-                <a:ea typeface="+mn-ea"/>
-                <a:cs typeface="+mn-cs"/>
-              </a:rPr>
-              <a:t>  Last action aborted (due to crash), but its changes to A are visible.</a:t>
-            </a:r>
-          </a:p>
-          <a:p>
-            <a:r>
-              <a:rPr lang="en-US" sz="1200" kern="1200" dirty="0">
-                <a:solidFill>
-                  <a:schemeClr val="tx1"/>
-                </a:solidFill>
-                <a:latin typeface="+mn-lt"/>
-                <a:ea typeface="+mn-ea"/>
-                <a:cs typeface="+mn-cs"/>
-              </a:rPr>
-              <a:t>  We're going to have to repair this in our recovery function.</a:t>
-            </a:r>
-          </a:p>
-          <a:p>
-            <a:r>
-              <a:rPr lang="en-US" sz="1200" kern="1200" dirty="0">
-                <a:solidFill>
-                  <a:schemeClr val="tx1"/>
-                </a:solidFill>
-                <a:latin typeface="+mn-lt"/>
-                <a:ea typeface="+mn-ea"/>
-                <a:cs typeface="+mn-cs"/>
-              </a:rPr>
-              <a:t>  Good thing we have the log to provide authoritative information.</a:t>
-            </a:r>
-          </a:p>
-          <a:p>
-            <a:endParaRPr lang="en-US" dirty="0"/>
+            <a:endParaRPr kumimoji="1" lang="zh-TW" altLang="en-US" dirty="0"/>
           </a:p>
         </p:txBody>
       </p:sp>
       <p:sp>
         <p:nvSpPr>
-          <p:cNvPr id="4" name="Slide Number Placeholder 3"/>
+          <p:cNvPr id="4" name="投影片編號版面配置區 3"/>
           <p:cNvSpPr>
             <a:spLocks noGrp="1"/>
           </p:cNvSpPr>
           <p:nvPr>
-            <p:ph type="sldNum" sz="quarter" idx="10"/>
+            <p:ph type="sldNum" sz="quarter" idx="5"/>
           </p:nvPr>
         </p:nvSpPr>
         <p:spPr/>
@@ -1544,18 +1385,18 @@
           <a:bodyPr/>
           <a:lstStyle/>
           <a:p>
-            <a:fld id="{B965D5C0-63AC-FB45-A601-92C1112B2A7B}" type="slidenum">
-              <a:rPr lang="en-US" smtClean="0"/>
-              <a:t>50</a:t>
+            <a:fld id="{3A84A077-83E9-49A7-9F59-234D78BD6949}" type="slidenum">
+              <a:rPr lang="zh-CN" altLang="en-US" smtClean="0"/>
+              <a:t>45</a:t>
             </a:fld>
-            <a:endParaRPr lang="en-US"/>
+            <a:endParaRPr lang="zh-CN" altLang="en-US"/>
           </a:p>
         </p:txBody>
       </p:sp>
     </p:spTree>
     <p:extLst>
       <p:ext uri="{BB962C8B-B14F-4D97-AF65-F5344CB8AC3E}">
-        <p14:creationId xmlns:p14="http://schemas.microsoft.com/office/powerpoint/2010/main" val="1403717139"/>
+        <p14:creationId xmlns:p14="http://schemas.microsoft.com/office/powerpoint/2010/main" val="1728939583"/>
       </p:ext>
     </p:extLst>
   </p:cSld>
@@ -1609,6 +1450,29 @@
           <a:bodyPr/>
           <a:lstStyle/>
           <a:p>
+            <a:pPr marL="0" marR="0" indent="0" algn="l" defTabSz="457200" rtl="0" eaLnBrk="1" fontAlgn="auto" latinLnBrk="0" hangingPunct="1">
+              <a:lnSpc>
+                <a:spcPct val="100000"/>
+              </a:lnSpc>
+              <a:spcBef>
+                <a:spcPts val="0"/>
+              </a:spcBef>
+              <a:spcAft>
+                <a:spcPts val="0"/>
+              </a:spcAft>
+              <a:buClrTx/>
+              <a:buSzTx/>
+              <a:buFontTx/>
+              <a:buNone/>
+              <a:tabLst/>
+              <a:defRPr/>
+            </a:pPr>
+            <a:r>
+              <a:rPr lang="en-US" dirty="0"/>
+              <a:t>    [ board: log, cell storage; updates going to both, read from cell storage ]</a:t>
+            </a:r>
+          </a:p>
+          <a:p>
             <a:endParaRPr lang="en-US" dirty="0"/>
           </a:p>
         </p:txBody>
@@ -1630,7 +1494,7 @@
           <a:p>
             <a:fld id="{B965D5C0-63AC-FB45-A601-92C1112B2A7B}" type="slidenum">
               <a:rPr lang="en-US" smtClean="0"/>
-              <a:t>52</a:t>
+              <a:t>47</a:t>
             </a:fld>
             <a:endParaRPr lang="en-US"/>
           </a:p>
@@ -1639,7 +1503,7 @@
     </p:spTree>
     <p:extLst>
       <p:ext uri="{BB962C8B-B14F-4D97-AF65-F5344CB8AC3E}">
-        <p14:creationId xmlns:p14="http://schemas.microsoft.com/office/powerpoint/2010/main" val="1729309133"/>
+        <p14:creationId xmlns:p14="http://schemas.microsoft.com/office/powerpoint/2010/main" val="3262575001"/>
       </p:ext>
     </p:extLst>
   </p:cSld>
@@ -1858,7 +1722,7 @@
           <a:p>
             <a:fld id="{B965D5C0-63AC-FB45-A601-92C1112B2A7B}" type="slidenum">
               <a:rPr lang="en-US" smtClean="0"/>
-              <a:t>53</a:t>
+              <a:t>50</a:t>
             </a:fld>
             <a:endParaRPr lang="en-US"/>
           </a:p>
@@ -1867,7 +1731,7 @@
     </p:spTree>
     <p:extLst>
       <p:ext uri="{BB962C8B-B14F-4D97-AF65-F5344CB8AC3E}">
-        <p14:creationId xmlns:p14="http://schemas.microsoft.com/office/powerpoint/2010/main" val="1595987878"/>
+        <p14:creationId xmlns:p14="http://schemas.microsoft.com/office/powerpoint/2010/main" val="1403717139"/>
       </p:ext>
     </p:extLst>
   </p:cSld>
@@ -1921,150 +1785,6 @@
           <a:bodyPr/>
           <a:lstStyle/>
           <a:p>
-            <a:r>
-              <a:rPr lang="en-US" sz="1200" kern="1200" dirty="0">
-                <a:solidFill>
-                  <a:schemeClr val="tx1"/>
-                </a:solidFill>
-                <a:latin typeface="+mn-lt"/>
-                <a:ea typeface="+mn-ea"/>
-                <a:cs typeface="+mn-cs"/>
-              </a:rPr>
-              <a:t>Recovery? Crash between</a:t>
-            </a:r>
-            <a:r>
-              <a:rPr lang="en-US" sz="1200" kern="1200" baseline="0" dirty="0">
-                <a:solidFill>
-                  <a:schemeClr val="tx1"/>
-                </a:solidFill>
-                <a:latin typeface="+mn-lt"/>
-                <a:ea typeface="+mn-ea"/>
-                <a:cs typeface="+mn-cs"/>
-              </a:rPr>
-              <a:t> logging and installing.</a:t>
-            </a:r>
-            <a:endParaRPr lang="en-US" sz="1200" kern="1200" dirty="0">
-              <a:solidFill>
-                <a:schemeClr val="tx1"/>
-              </a:solidFill>
-              <a:latin typeface="+mn-lt"/>
-              <a:ea typeface="+mn-ea"/>
-              <a:cs typeface="+mn-cs"/>
-            </a:endParaRPr>
-          </a:p>
-          <a:p>
-            <a:r>
-              <a:rPr lang="en-US" sz="1200" kern="1200" dirty="0">
-                <a:solidFill>
-                  <a:schemeClr val="tx1"/>
-                </a:solidFill>
-                <a:latin typeface="+mn-lt"/>
-                <a:ea typeface="+mn-ea"/>
-                <a:cs typeface="+mn-cs"/>
-              </a:rPr>
-              <a:t>Write is not all-or-nothing!</a:t>
-            </a:r>
-            <a:r>
-              <a:rPr lang="en-US" sz="1200" kern="1200" baseline="0" dirty="0">
-                <a:solidFill>
-                  <a:schemeClr val="tx1"/>
-                </a:solidFill>
-                <a:latin typeface="+mn-lt"/>
-                <a:ea typeface="+mn-ea"/>
-                <a:cs typeface="+mn-cs"/>
-              </a:rPr>
-              <a:t> install value before commit? what if crash? Need to roll back to old value (which is saved in the log)</a:t>
-            </a:r>
-          </a:p>
-          <a:p>
-            <a:endParaRPr lang="en-US" sz="1200" kern="1200" dirty="0">
-              <a:solidFill>
-                <a:schemeClr val="tx1"/>
-              </a:solidFill>
-              <a:latin typeface="+mn-lt"/>
-              <a:ea typeface="+mn-ea"/>
-              <a:cs typeface="+mn-cs"/>
-            </a:endParaRPr>
-          </a:p>
-          <a:p>
-            <a:r>
-              <a:rPr lang="en-US" sz="1200" kern="1200" dirty="0">
-                <a:solidFill>
-                  <a:schemeClr val="tx1"/>
-                </a:solidFill>
-                <a:latin typeface="+mn-lt"/>
-                <a:ea typeface="+mn-ea"/>
-                <a:cs typeface="+mn-cs"/>
-              </a:rPr>
-              <a:t>  Log still contains the same things.</a:t>
-            </a:r>
-          </a:p>
-          <a:p>
-            <a:r>
-              <a:rPr lang="en-US" sz="1200" kern="1200" dirty="0">
-                <a:solidFill>
-                  <a:schemeClr val="tx1"/>
-                </a:solidFill>
-                <a:latin typeface="+mn-lt"/>
-                <a:ea typeface="+mn-ea"/>
-                <a:cs typeface="+mn-cs"/>
-              </a:rPr>
-              <a:t>  As we're running, maintain cell storage for A and B.</a:t>
-            </a:r>
-          </a:p>
-          <a:p>
-            <a:r>
-              <a:rPr lang="en-US" sz="1200" kern="1200" dirty="0">
-                <a:solidFill>
-                  <a:schemeClr val="tx1"/>
-                </a:solidFill>
-                <a:latin typeface="+mn-lt"/>
-                <a:ea typeface="+mn-ea"/>
-                <a:cs typeface="+mn-cs"/>
-              </a:rPr>
-              <a:t>  Except one problem: after crash, A's value in cell storage is wrong.</a:t>
-            </a:r>
-          </a:p>
-          <a:p>
-            <a:r>
-              <a:rPr lang="en-US" sz="1200" kern="1200" dirty="0">
-                <a:solidFill>
-                  <a:schemeClr val="tx1"/>
-                </a:solidFill>
-                <a:latin typeface="+mn-lt"/>
-                <a:ea typeface="+mn-ea"/>
-                <a:cs typeface="+mn-cs"/>
-              </a:rPr>
-              <a:t>  Last action aborted (due to crash), but its changes to A are visible.</a:t>
-            </a:r>
-          </a:p>
-          <a:p>
-            <a:r>
-              <a:rPr lang="en-US" sz="1200" kern="1200" dirty="0">
-                <a:solidFill>
-                  <a:schemeClr val="tx1"/>
-                </a:solidFill>
-                <a:latin typeface="+mn-lt"/>
-                <a:ea typeface="+mn-ea"/>
-                <a:cs typeface="+mn-cs"/>
-              </a:rPr>
-              <a:t>  We're going to have to repair this in our recovery function.</a:t>
-            </a:r>
-          </a:p>
-          <a:p>
-            <a:r>
-              <a:rPr lang="en-US" sz="1200" kern="1200" dirty="0">
-                <a:solidFill>
-                  <a:schemeClr val="tx1"/>
-                </a:solidFill>
-                <a:latin typeface="+mn-lt"/>
-                <a:ea typeface="+mn-ea"/>
-                <a:cs typeface="+mn-cs"/>
-              </a:rPr>
-              <a:t>  Good thing we have the log to provide authoritative information.</a:t>
-            </a:r>
-          </a:p>
-          <a:p>
             <a:endParaRPr lang="en-US" dirty="0"/>
           </a:p>
         </p:txBody>
@@ -2086,7 +1806,7 @@
           <a:p>
             <a:fld id="{B965D5C0-63AC-FB45-A601-92C1112B2A7B}" type="slidenum">
               <a:rPr lang="en-US" smtClean="0"/>
-              <a:t>54</a:t>
+              <a:t>52</a:t>
             </a:fld>
             <a:endParaRPr lang="en-US"/>
           </a:p>
@@ -2095,7 +1815,7 @@
     </p:spTree>
     <p:extLst>
       <p:ext uri="{BB962C8B-B14F-4D97-AF65-F5344CB8AC3E}">
-        <p14:creationId xmlns:p14="http://schemas.microsoft.com/office/powerpoint/2010/main" val="362315511"/>
+        <p14:creationId xmlns:p14="http://schemas.microsoft.com/office/powerpoint/2010/main" val="1729309133"/>
       </p:ext>
     </p:extLst>
   </p:cSld>
@@ -2149,6 +1869,150 @@
           <a:bodyPr/>
           <a:lstStyle/>
           <a:p>
+            <a:r>
+              <a:rPr lang="en-US" sz="1200" kern="1200" dirty="0">
+                <a:solidFill>
+                  <a:schemeClr val="tx1"/>
+                </a:solidFill>
+                <a:latin typeface="+mn-lt"/>
+                <a:ea typeface="+mn-ea"/>
+                <a:cs typeface="+mn-cs"/>
+              </a:rPr>
+              <a:t>Recovery? Crash between</a:t>
+            </a:r>
+            <a:r>
+              <a:rPr lang="en-US" sz="1200" kern="1200" baseline="0" dirty="0">
+                <a:solidFill>
+                  <a:schemeClr val="tx1"/>
+                </a:solidFill>
+                <a:latin typeface="+mn-lt"/>
+                <a:ea typeface="+mn-ea"/>
+                <a:cs typeface="+mn-cs"/>
+              </a:rPr>
+              <a:t> logging and installing.</a:t>
+            </a:r>
+            <a:endParaRPr lang="en-US" sz="1200" kern="1200" dirty="0">
+              <a:solidFill>
+                <a:schemeClr val="tx1"/>
+              </a:solidFill>
+              <a:latin typeface="+mn-lt"/>
+              <a:ea typeface="+mn-ea"/>
+              <a:cs typeface="+mn-cs"/>
+            </a:endParaRPr>
+          </a:p>
+          <a:p>
+            <a:r>
+              <a:rPr lang="en-US" sz="1200" kern="1200" dirty="0">
+                <a:solidFill>
+                  <a:schemeClr val="tx1"/>
+                </a:solidFill>
+                <a:latin typeface="+mn-lt"/>
+                <a:ea typeface="+mn-ea"/>
+                <a:cs typeface="+mn-cs"/>
+              </a:rPr>
+              <a:t>Write is not all-or-nothing!</a:t>
+            </a:r>
+            <a:r>
+              <a:rPr lang="en-US" sz="1200" kern="1200" baseline="0" dirty="0">
+                <a:solidFill>
+                  <a:schemeClr val="tx1"/>
+                </a:solidFill>
+                <a:latin typeface="+mn-lt"/>
+                <a:ea typeface="+mn-ea"/>
+                <a:cs typeface="+mn-cs"/>
+              </a:rPr>
+              <a:t> install value before commit? what if crash? Need to roll back to old value (which is saved in the log)</a:t>
+            </a:r>
+          </a:p>
+          <a:p>
+            <a:endParaRPr lang="en-US" sz="1200" kern="1200" dirty="0">
+              <a:solidFill>
+                <a:schemeClr val="tx1"/>
+              </a:solidFill>
+              <a:latin typeface="+mn-lt"/>
+              <a:ea typeface="+mn-ea"/>
+              <a:cs typeface="+mn-cs"/>
+            </a:endParaRPr>
+          </a:p>
+          <a:p>
+            <a:r>
+              <a:rPr lang="en-US" sz="1200" kern="1200" dirty="0">
+                <a:solidFill>
+                  <a:schemeClr val="tx1"/>
+                </a:solidFill>
+                <a:latin typeface="+mn-lt"/>
+                <a:ea typeface="+mn-ea"/>
+                <a:cs typeface="+mn-cs"/>
+              </a:rPr>
+              <a:t>  Log still contains the same things.</a:t>
+            </a:r>
+          </a:p>
+          <a:p>
+            <a:r>
+              <a:rPr lang="en-US" sz="1200" kern="1200" dirty="0">
+                <a:solidFill>
+                  <a:schemeClr val="tx1"/>
+                </a:solidFill>
+                <a:latin typeface="+mn-lt"/>
+                <a:ea typeface="+mn-ea"/>
+                <a:cs typeface="+mn-cs"/>
+              </a:rPr>
+              <a:t>  As we're running, maintain cell storage for A and B.</a:t>
+            </a:r>
+          </a:p>
+          <a:p>
+            <a:r>
+              <a:rPr lang="en-US" sz="1200" kern="1200" dirty="0">
+                <a:solidFill>
+                  <a:schemeClr val="tx1"/>
+                </a:solidFill>
+                <a:latin typeface="+mn-lt"/>
+                <a:ea typeface="+mn-ea"/>
+                <a:cs typeface="+mn-cs"/>
+              </a:rPr>
+              <a:t>  Except one problem: after crash, A's value in cell storage is wrong.</a:t>
+            </a:r>
+          </a:p>
+          <a:p>
+            <a:r>
+              <a:rPr lang="en-US" sz="1200" kern="1200" dirty="0">
+                <a:solidFill>
+                  <a:schemeClr val="tx1"/>
+                </a:solidFill>
+                <a:latin typeface="+mn-lt"/>
+                <a:ea typeface="+mn-ea"/>
+                <a:cs typeface="+mn-cs"/>
+              </a:rPr>
+              <a:t>  Last action aborted (due to crash), but its changes to A are visible.</a:t>
+            </a:r>
+          </a:p>
+          <a:p>
+            <a:r>
+              <a:rPr lang="en-US" sz="1200" kern="1200" dirty="0">
+                <a:solidFill>
+                  <a:schemeClr val="tx1"/>
+                </a:solidFill>
+                <a:latin typeface="+mn-lt"/>
+                <a:ea typeface="+mn-ea"/>
+                <a:cs typeface="+mn-cs"/>
+              </a:rPr>
+              <a:t>  We're going to have to repair this in our recovery function.</a:t>
+            </a:r>
+          </a:p>
+          <a:p>
+            <a:r>
+              <a:rPr lang="en-US" sz="1200" kern="1200" dirty="0">
+                <a:solidFill>
+                  <a:schemeClr val="tx1"/>
+                </a:solidFill>
+                <a:latin typeface="+mn-lt"/>
+                <a:ea typeface="+mn-ea"/>
+                <a:cs typeface="+mn-cs"/>
+              </a:rPr>
+              <a:t>  Good thing we have the log to provide authoritative information.</a:t>
+            </a:r>
+          </a:p>
+          <a:p>
             <a:endParaRPr lang="en-US" dirty="0"/>
           </a:p>
         </p:txBody>
@@ -2170,7 +2034,7 @@
           <a:p>
             <a:fld id="{B965D5C0-63AC-FB45-A601-92C1112B2A7B}" type="slidenum">
               <a:rPr lang="en-US" smtClean="0"/>
-              <a:t>55</a:t>
+              <a:t>53</a:t>
             </a:fld>
             <a:endParaRPr lang="en-US"/>
           </a:p>
@@ -2179,7 +2043,7 @@
     </p:spTree>
     <p:extLst>
       <p:ext uri="{BB962C8B-B14F-4D97-AF65-F5344CB8AC3E}">
-        <p14:creationId xmlns:p14="http://schemas.microsoft.com/office/powerpoint/2010/main" val="1843919537"/>
+        <p14:creationId xmlns:p14="http://schemas.microsoft.com/office/powerpoint/2010/main" val="1595987878"/>
       </p:ext>
     </p:extLst>
   </p:cSld>
@@ -2526,6 +2390,150 @@
           <a:bodyPr/>
           <a:lstStyle/>
           <a:p>
+            <a:r>
+              <a:rPr lang="en-US" sz="1200" kern="1200" dirty="0">
+                <a:solidFill>
+                  <a:schemeClr val="tx1"/>
+                </a:solidFill>
+                <a:latin typeface="+mn-lt"/>
+                <a:ea typeface="+mn-ea"/>
+                <a:cs typeface="+mn-cs"/>
+              </a:rPr>
+              <a:t>Recovery? Crash between</a:t>
+            </a:r>
+            <a:r>
+              <a:rPr lang="en-US" sz="1200" kern="1200" baseline="0" dirty="0">
+                <a:solidFill>
+                  <a:schemeClr val="tx1"/>
+                </a:solidFill>
+                <a:latin typeface="+mn-lt"/>
+                <a:ea typeface="+mn-ea"/>
+                <a:cs typeface="+mn-cs"/>
+              </a:rPr>
+              <a:t> logging and installing.</a:t>
+            </a:r>
+            <a:endParaRPr lang="en-US" sz="1200" kern="1200" dirty="0">
+              <a:solidFill>
+                <a:schemeClr val="tx1"/>
+              </a:solidFill>
+              <a:latin typeface="+mn-lt"/>
+              <a:ea typeface="+mn-ea"/>
+              <a:cs typeface="+mn-cs"/>
+            </a:endParaRPr>
+          </a:p>
+          <a:p>
+            <a:r>
+              <a:rPr lang="en-US" sz="1200" kern="1200" dirty="0">
+                <a:solidFill>
+                  <a:schemeClr val="tx1"/>
+                </a:solidFill>
+                <a:latin typeface="+mn-lt"/>
+                <a:ea typeface="+mn-ea"/>
+                <a:cs typeface="+mn-cs"/>
+              </a:rPr>
+              <a:t>Write is not all-or-nothing!</a:t>
+            </a:r>
+            <a:r>
+              <a:rPr lang="en-US" sz="1200" kern="1200" baseline="0" dirty="0">
+                <a:solidFill>
+                  <a:schemeClr val="tx1"/>
+                </a:solidFill>
+                <a:latin typeface="+mn-lt"/>
+                <a:ea typeface="+mn-ea"/>
+                <a:cs typeface="+mn-cs"/>
+              </a:rPr>
+              <a:t> install value before commit? what if crash? Need to roll back to old value (which is saved in the log)</a:t>
+            </a:r>
+          </a:p>
+          <a:p>
+            <a:endParaRPr lang="en-US" sz="1200" kern="1200" dirty="0">
+              <a:solidFill>
+                <a:schemeClr val="tx1"/>
+              </a:solidFill>
+              <a:latin typeface="+mn-lt"/>
+              <a:ea typeface="+mn-ea"/>
+              <a:cs typeface="+mn-cs"/>
+            </a:endParaRPr>
+          </a:p>
+          <a:p>
+            <a:r>
+              <a:rPr lang="en-US" sz="1200" kern="1200" dirty="0">
+                <a:solidFill>
+                  <a:schemeClr val="tx1"/>
+                </a:solidFill>
+                <a:latin typeface="+mn-lt"/>
+                <a:ea typeface="+mn-ea"/>
+                <a:cs typeface="+mn-cs"/>
+              </a:rPr>
+              <a:t>  Log still contains the same things.</a:t>
+            </a:r>
+          </a:p>
+          <a:p>
+            <a:r>
+              <a:rPr lang="en-US" sz="1200" kern="1200" dirty="0">
+                <a:solidFill>
+                  <a:schemeClr val="tx1"/>
+                </a:solidFill>
+                <a:latin typeface="+mn-lt"/>
+                <a:ea typeface="+mn-ea"/>
+                <a:cs typeface="+mn-cs"/>
+              </a:rPr>
+              <a:t>  As we're running, maintain cell storage for A and B.</a:t>
+            </a:r>
+          </a:p>
+          <a:p>
+            <a:r>
+              <a:rPr lang="en-US" sz="1200" kern="1200" dirty="0">
+                <a:solidFill>
+                  <a:schemeClr val="tx1"/>
+                </a:solidFill>
+                <a:latin typeface="+mn-lt"/>
+                <a:ea typeface="+mn-ea"/>
+                <a:cs typeface="+mn-cs"/>
+              </a:rPr>
+              <a:t>  Except one problem: after crash, A's value in cell storage is wrong.</a:t>
+            </a:r>
+          </a:p>
+          <a:p>
+            <a:r>
+              <a:rPr lang="en-US" sz="1200" kern="1200" dirty="0">
+                <a:solidFill>
+                  <a:schemeClr val="tx1"/>
+                </a:solidFill>
+                <a:latin typeface="+mn-lt"/>
+                <a:ea typeface="+mn-ea"/>
+                <a:cs typeface="+mn-cs"/>
+              </a:rPr>
+              <a:t>  Last action aborted (due to crash), but its changes to A are visible.</a:t>
+            </a:r>
+          </a:p>
+          <a:p>
+            <a:r>
+              <a:rPr lang="en-US" sz="1200" kern="1200" dirty="0">
+                <a:solidFill>
+                  <a:schemeClr val="tx1"/>
+                </a:solidFill>
+                <a:latin typeface="+mn-lt"/>
+                <a:ea typeface="+mn-ea"/>
+                <a:cs typeface="+mn-cs"/>
+              </a:rPr>
+              <a:t>  We're going to have to repair this in our recovery function.</a:t>
+            </a:r>
+          </a:p>
+          <a:p>
+            <a:r>
+              <a:rPr lang="en-US" sz="1200" kern="1200" dirty="0">
+                <a:solidFill>
+                  <a:schemeClr val="tx1"/>
+                </a:solidFill>
+                <a:latin typeface="+mn-lt"/>
+                <a:ea typeface="+mn-ea"/>
+                <a:cs typeface="+mn-cs"/>
+              </a:rPr>
+              <a:t>  Good thing we have the log to provide authoritative information.</a:t>
+            </a:r>
+          </a:p>
+          <a:p>
             <a:endParaRPr lang="en-US" dirty="0"/>
           </a:p>
         </p:txBody>
@@ -2547,7 +2555,7 @@
           <a:p>
             <a:fld id="{B965D5C0-63AC-FB45-A601-92C1112B2A7B}" type="slidenum">
               <a:rPr lang="en-US" smtClean="0"/>
-              <a:t>56</a:t>
+              <a:t>54</a:t>
             </a:fld>
             <a:endParaRPr lang="en-US"/>
           </a:p>
@@ -2556,7 +2564,7 @@
     </p:spTree>
     <p:extLst>
       <p:ext uri="{BB962C8B-B14F-4D97-AF65-F5344CB8AC3E}">
-        <p14:creationId xmlns:p14="http://schemas.microsoft.com/office/powerpoint/2010/main" val="902306373"/>
+        <p14:creationId xmlns:p14="http://schemas.microsoft.com/office/powerpoint/2010/main" val="362315511"/>
       </p:ext>
     </p:extLst>
   </p:cSld>
@@ -2631,6 +2639,258 @@
           <a:p>
             <a:fld id="{B965D5C0-63AC-FB45-A601-92C1112B2A7B}" type="slidenum">
               <a:rPr lang="en-US" smtClean="0"/>
+              <a:t>55</a:t>
+            </a:fld>
+            <a:endParaRPr lang="en-US"/>
+          </a:p>
+        </p:txBody>
+      </p:sp>
+    </p:spTree>
+    <p:extLst>
+      <p:ext uri="{BB962C8B-B14F-4D97-AF65-F5344CB8AC3E}">
+        <p14:creationId xmlns:p14="http://schemas.microsoft.com/office/powerpoint/2010/main" val="1843919537"/>
+      </p:ext>
+    </p:extLst>
+  </p:cSld>
+  <p:clrMapOvr>
+    <a:masterClrMapping/>
+  </p:clrMapOvr>
+</p:notes>
+</file>
+
+<file path=ppt/notesSlides/notesSlide22.xml><?xml version="1.0" encoding="utf-8"?>
+<p:notes xmlns:a="http://schemas.openxmlformats.org/drawingml/2006/main" xmlns:r="http://schemas.openxmlformats.org/officeDocument/2006/relationships" xmlns:p="http://schemas.openxmlformats.org/presentationml/2006/main">
+  <p:cSld>
+    <p:spTree>
+      <p:nvGrpSpPr>
+        <p:cNvPr id="1" name=""/>
+        <p:cNvGrpSpPr/>
+        <p:nvPr/>
+      </p:nvGrpSpPr>
+      <p:grpSpPr>
+        <a:xfrm>
+          <a:off x="0" y="0"/>
+          <a:ext cx="0" cy="0"/>
+          <a:chOff x="0" y="0"/>
+          <a:chExt cx="0" cy="0"/>
+        </a:xfrm>
+      </p:grpSpPr>
+      <p:sp>
+        <p:nvSpPr>
+          <p:cNvPr id="2" name="Slide Image Placeholder 1"/>
+          <p:cNvSpPr>
+            <a:spLocks noGrp="1" noRot="1" noChangeAspect="1"/>
+          </p:cNvSpPr>
+          <p:nvPr>
+            <p:ph type="sldImg"/>
+          </p:nvPr>
+        </p:nvSpPr>
+        <p:spPr/>
+      </p:sp>
+      <p:sp>
+        <p:nvSpPr>
+          <p:cNvPr id="3" name="Notes Placeholder 2"/>
+          <p:cNvSpPr>
+            <a:spLocks noGrp="1"/>
+          </p:cNvSpPr>
+          <p:nvPr>
+            <p:ph type="body" idx="1"/>
+          </p:nvPr>
+        </p:nvSpPr>
+        <p:spPr/>
+        <p:txBody>
+          <a:bodyPr/>
+          <a:lstStyle/>
+          <a:p>
+            <a:endParaRPr lang="en-US" dirty="0"/>
+          </a:p>
+        </p:txBody>
+      </p:sp>
+      <p:sp>
+        <p:nvSpPr>
+          <p:cNvPr id="4" name="Slide Number Placeholder 3"/>
+          <p:cNvSpPr>
+            <a:spLocks noGrp="1"/>
+          </p:cNvSpPr>
+          <p:nvPr>
+            <p:ph type="sldNum" sz="quarter" idx="10"/>
+          </p:nvPr>
+        </p:nvSpPr>
+        <p:spPr/>
+        <p:txBody>
+          <a:bodyPr/>
+          <a:lstStyle/>
+          <a:p>
+            <a:fld id="{B965D5C0-63AC-FB45-A601-92C1112B2A7B}" type="slidenum">
+              <a:rPr lang="en-US" smtClean="0"/>
+              <a:t>56</a:t>
+            </a:fld>
+            <a:endParaRPr lang="en-US"/>
+          </a:p>
+        </p:txBody>
+      </p:sp>
+    </p:spTree>
+    <p:extLst>
+      <p:ext uri="{BB962C8B-B14F-4D97-AF65-F5344CB8AC3E}">
+        <p14:creationId xmlns:p14="http://schemas.microsoft.com/office/powerpoint/2010/main" val="902306373"/>
+      </p:ext>
+    </p:extLst>
+  </p:cSld>
+  <p:clrMapOvr>
+    <a:masterClrMapping/>
+  </p:clrMapOvr>
+</p:notes>
+</file>
+
+<file path=ppt/notesSlides/notesSlide23.xml><?xml version="1.0" encoding="utf-8"?>
+<p:notes xmlns:a="http://schemas.openxmlformats.org/drawingml/2006/main" xmlns:r="http://schemas.openxmlformats.org/officeDocument/2006/relationships" xmlns:p="http://schemas.openxmlformats.org/presentationml/2006/main">
+  <p:cSld>
+    <p:spTree>
+      <p:nvGrpSpPr>
+        <p:cNvPr id="1" name=""/>
+        <p:cNvGrpSpPr/>
+        <p:nvPr/>
+      </p:nvGrpSpPr>
+      <p:grpSpPr>
+        <a:xfrm>
+          <a:off x="0" y="0"/>
+          <a:ext cx="0" cy="0"/>
+          <a:chOff x="0" y="0"/>
+          <a:chExt cx="0" cy="0"/>
+        </a:xfrm>
+      </p:grpSpPr>
+      <p:sp>
+        <p:nvSpPr>
+          <p:cNvPr id="2" name="投影片影像版面配置區 1"/>
+          <p:cNvSpPr>
+            <a:spLocks noGrp="1" noRot="1" noChangeAspect="1"/>
+          </p:cNvSpPr>
+          <p:nvPr>
+            <p:ph type="sldImg"/>
+          </p:nvPr>
+        </p:nvSpPr>
+        <p:spPr/>
+      </p:sp>
+      <p:sp>
+        <p:nvSpPr>
+          <p:cNvPr id="3" name="備忘稿版面配置區 2"/>
+          <p:cNvSpPr>
+            <a:spLocks noGrp="1"/>
+          </p:cNvSpPr>
+          <p:nvPr>
+            <p:ph type="body" idx="1"/>
+          </p:nvPr>
+        </p:nvSpPr>
+        <p:spPr/>
+        <p:txBody>
+          <a:bodyPr/>
+          <a:lstStyle/>
+          <a:p>
+            <a:endParaRPr kumimoji="1" lang="zh-TW" altLang="en-US" dirty="0"/>
+          </a:p>
+        </p:txBody>
+      </p:sp>
+      <p:sp>
+        <p:nvSpPr>
+          <p:cNvPr id="4" name="投影片編號版面配置區 3"/>
+          <p:cNvSpPr>
+            <a:spLocks noGrp="1"/>
+          </p:cNvSpPr>
+          <p:nvPr>
+            <p:ph type="sldNum" sz="quarter" idx="5"/>
+          </p:nvPr>
+        </p:nvSpPr>
+        <p:spPr/>
+        <p:txBody>
+          <a:bodyPr/>
+          <a:lstStyle/>
+          <a:p>
+            <a:fld id="{3A84A077-83E9-49A7-9F59-234D78BD6949}" type="slidenum">
+              <a:rPr lang="zh-CN" altLang="en-US" smtClean="0"/>
+              <a:t>58</a:t>
+            </a:fld>
+            <a:endParaRPr lang="zh-CN" altLang="en-US"/>
+          </a:p>
+        </p:txBody>
+      </p:sp>
+    </p:spTree>
+    <p:extLst>
+      <p:ext uri="{BB962C8B-B14F-4D97-AF65-F5344CB8AC3E}">
+        <p14:creationId xmlns:p14="http://schemas.microsoft.com/office/powerpoint/2010/main" val="3302427893"/>
+      </p:ext>
+    </p:extLst>
+  </p:cSld>
+  <p:clrMapOvr>
+    <a:masterClrMapping/>
+  </p:clrMapOvr>
+</p:notes>
+</file>
+
+<file path=ppt/notesSlides/notesSlide24.xml><?xml version="1.0" encoding="utf-8"?>
+<p:notes xmlns:a="http://schemas.openxmlformats.org/drawingml/2006/main" xmlns:r="http://schemas.openxmlformats.org/officeDocument/2006/relationships" xmlns:p="http://schemas.openxmlformats.org/presentationml/2006/main">
+  <p:cSld>
+    <p:spTree>
+      <p:nvGrpSpPr>
+        <p:cNvPr id="1" name=""/>
+        <p:cNvGrpSpPr/>
+        <p:nvPr/>
+      </p:nvGrpSpPr>
+      <p:grpSpPr>
+        <a:xfrm>
+          <a:off x="0" y="0"/>
+          <a:ext cx="0" cy="0"/>
+          <a:chOff x="0" y="0"/>
+          <a:chExt cx="0" cy="0"/>
+        </a:xfrm>
+      </p:grpSpPr>
+      <p:sp>
+        <p:nvSpPr>
+          <p:cNvPr id="2" name="Slide Image Placeholder 1"/>
+          <p:cNvSpPr>
+            <a:spLocks noGrp="1" noRot="1" noChangeAspect="1"/>
+          </p:cNvSpPr>
+          <p:nvPr>
+            <p:ph type="sldImg"/>
+          </p:nvPr>
+        </p:nvSpPr>
+        <p:spPr/>
+      </p:sp>
+      <p:sp>
+        <p:nvSpPr>
+          <p:cNvPr id="3" name="Notes Placeholder 2"/>
+          <p:cNvSpPr>
+            <a:spLocks noGrp="1"/>
+          </p:cNvSpPr>
+          <p:nvPr>
+            <p:ph type="body" idx="1"/>
+          </p:nvPr>
+        </p:nvSpPr>
+        <p:spPr/>
+        <p:txBody>
+          <a:bodyPr/>
+          <a:lstStyle/>
+          <a:p>
+            <a:endParaRPr lang="en-US" dirty="0"/>
+          </a:p>
+        </p:txBody>
+      </p:sp>
+      <p:sp>
+        <p:nvSpPr>
+          <p:cNvPr id="4" name="Slide Number Placeholder 3"/>
+          <p:cNvSpPr>
+            <a:spLocks noGrp="1"/>
+          </p:cNvSpPr>
+          <p:nvPr>
+            <p:ph type="sldNum" sz="quarter" idx="10"/>
+          </p:nvPr>
+        </p:nvSpPr>
+        <p:spPr/>
+        <p:txBody>
+          <a:bodyPr/>
+          <a:lstStyle/>
+          <a:p>
+            <a:fld id="{B965D5C0-63AC-FB45-A601-92C1112B2A7B}" type="slidenum">
+              <a:rPr lang="en-US" smtClean="0"/>
               <a:t>59</a:t>
             </a:fld>
             <a:endParaRPr lang="en-US"/>
@@ -2650,7 +2910,7 @@
 </p:notes>
 </file>
 
-<file path=ppt/notesSlides/notesSlide22.xml><?xml version="1.0" encoding="utf-8"?>
+<file path=ppt/notesSlides/notesSlide25.xml><?xml version="1.0" encoding="utf-8"?>
 <p:notes xmlns:a="http://schemas.openxmlformats.org/drawingml/2006/main" xmlns:r="http://schemas.openxmlformats.org/officeDocument/2006/relationships" xmlns:p="http://schemas.openxmlformats.org/presentationml/2006/main">
   <p:cSld>
     <p:spTree>
@@ -3635,7 +3895,7 @@
       </p:grpSpPr>
       <p:sp>
         <p:nvSpPr>
-          <p:cNvPr id="2" name="Slide Image Placeholder 1"/>
+          <p:cNvPr id="2" name="投影片影像版面配置區 1"/>
           <p:cNvSpPr>
             <a:spLocks noGrp="1" noRot="1" noChangeAspect="1"/>
           </p:cNvSpPr>
@@ -3647,7 +3907,7 @@
       </p:sp>
       <p:sp>
         <p:nvSpPr>
-          <p:cNvPr id="3" name="Notes Placeholder 2"/>
+          <p:cNvPr id="3" name="備忘稿版面配置區 2"/>
           <p:cNvSpPr>
             <a:spLocks noGrp="1"/>
           </p:cNvSpPr>
@@ -3660,26 +3920,18 @@
           <a:bodyPr/>
           <a:lstStyle/>
           <a:p>
-            <a:r>
-              <a:rPr lang="en-US" dirty="0"/>
-              <a:t>not</a:t>
-            </a:r>
-            <a:r>
-              <a:rPr lang="en-US" baseline="0" dirty="0"/>
-              <a:t> everything can be a transaction.</a:t>
-            </a:r>
-            <a:endParaRPr lang="en-US" dirty="0"/>
+            <a:endParaRPr kumimoji="1" lang="zh-TW" altLang="en-US" dirty="0"/>
           </a:p>
         </p:txBody>
       </p:sp>
       <p:sp>
         <p:nvSpPr>
-          <p:cNvPr id="4" name="Slide Number Placeholder 3"/>
+          <p:cNvPr id="4" name="投影片編號版面配置區 3"/>
           <p:cNvSpPr>
             <a:spLocks noGrp="1"/>
           </p:cNvSpPr>
           <p:nvPr>
-            <p:ph type="sldNum" sz="quarter" idx="10"/>
+            <p:ph type="sldNum" sz="quarter" idx="5"/>
           </p:nvPr>
         </p:nvSpPr>
         <p:spPr/>
@@ -3687,9 +3939,9 @@
           <a:bodyPr/>
           <a:lstStyle/>
           <a:p>
-            <a:fld id="{CF5B8B3F-0F45-4AAD-B4A8-B1F7D58CB493}" type="slidenum">
+            <a:fld id="{3A84A077-83E9-49A7-9F59-234D78BD6949}" type="slidenum">
               <a:rPr lang="zh-CN" altLang="en-US" smtClean="0"/>
-              <a:t>38</a:t>
+              <a:t>34</a:t>
             </a:fld>
             <a:endParaRPr lang="zh-CN" altLang="en-US"/>
           </a:p>
@@ -3698,7 +3950,7 @@
     </p:spTree>
     <p:extLst>
       <p:ext uri="{BB962C8B-B14F-4D97-AF65-F5344CB8AC3E}">
-        <p14:creationId xmlns:p14="http://schemas.microsoft.com/office/powerpoint/2010/main" val="943306724"/>
+        <p14:creationId xmlns:p14="http://schemas.microsoft.com/office/powerpoint/2010/main" val="364179597"/>
       </p:ext>
     </p:extLst>
   </p:cSld>
@@ -3896,7 +4148,7 @@
             <a:fld id="{66A7A40B-EA42-4A59-BDB5-85EFA65BC5FC}" type="datetimeFigureOut">
               <a:rPr lang="zh-CN" altLang="en-US" smtClean="0"/>
               <a:pPr/>
-              <a:t>2019/10/31</a:t>
+              <a:t>2019/12/22</a:t>
             </a:fld>
             <a:endParaRPr lang="zh-CN" altLang="en-US" dirty="0"/>
           </a:p>
@@ -4098,7 +4350,7 @@
             <a:fld id="{66A7A40B-EA42-4A59-BDB5-85EFA65BC5FC}" type="datetimeFigureOut">
               <a:rPr lang="zh-CN" altLang="en-US" smtClean="0"/>
               <a:pPr/>
-              <a:t>2019/10/31</a:t>
+              <a:t>2019/12/22</a:t>
             </a:fld>
             <a:endParaRPr lang="zh-CN" altLang="en-US" dirty="0"/>
           </a:p>
@@ -4310,7 +4562,7 @@
             <a:fld id="{66A7A40B-EA42-4A59-BDB5-85EFA65BC5FC}" type="datetimeFigureOut">
               <a:rPr lang="zh-CN" altLang="en-US" smtClean="0"/>
               <a:pPr/>
-              <a:t>2019/10/31</a:t>
+              <a:t>2019/12/22</a:t>
             </a:fld>
             <a:endParaRPr lang="zh-CN" altLang="en-US" dirty="0"/>
           </a:p>
@@ -4522,7 +4774,7 @@
             <a:fld id="{208313BE-D12C-455C-A881-17A0D46B2F62}" type="datetimeFigureOut">
               <a:rPr lang="zh-CN" altLang="en-US" smtClean="0"/>
               <a:pPr/>
-              <a:t>2019/10/31</a:t>
+              <a:t>2019/12/22</a:t>
             </a:fld>
             <a:endParaRPr lang="zh-CN" altLang="en-US" dirty="0"/>
           </a:p>
@@ -4804,7 +5056,7 @@
             <a:fld id="{208313BE-D12C-455C-A881-17A0D46B2F62}" type="datetimeFigureOut">
               <a:rPr lang="zh-CN" altLang="en-US" smtClean="0"/>
               <a:pPr/>
-              <a:t>2019/10/31</a:t>
+              <a:t>2019/12/22</a:t>
             </a:fld>
             <a:endParaRPr lang="zh-CN" altLang="en-US" dirty="0"/>
           </a:p>
@@ -5063,7 +5315,7 @@
             <a:fld id="{208313BE-D12C-455C-A881-17A0D46B2F62}" type="datetimeFigureOut">
               <a:rPr lang="zh-CN" altLang="en-US" smtClean="0"/>
               <a:pPr/>
-              <a:t>2019/10/31</a:t>
+              <a:t>2019/12/22</a:t>
             </a:fld>
             <a:endParaRPr lang="zh-CN" altLang="en-US" dirty="0"/>
           </a:p>
@@ -5342,7 +5594,7 @@
             <a:fld id="{208313BE-D12C-455C-A881-17A0D46B2F62}" type="datetimeFigureOut">
               <a:rPr lang="zh-CN" altLang="en-US" smtClean="0"/>
               <a:pPr/>
-              <a:t>2019/10/31</a:t>
+              <a:t>2019/12/22</a:t>
             </a:fld>
             <a:endParaRPr lang="zh-CN" altLang="en-US" dirty="0"/>
           </a:p>
@@ -5756,7 +6008,7 @@
             <a:fld id="{208313BE-D12C-455C-A881-17A0D46B2F62}" type="datetimeFigureOut">
               <a:rPr lang="zh-CN" altLang="en-US" smtClean="0"/>
               <a:pPr/>
-              <a:t>2019/10/31</a:t>
+              <a:t>2019/12/22</a:t>
             </a:fld>
             <a:endParaRPr lang="zh-CN" altLang="en-US" dirty="0"/>
           </a:p>
@@ -5891,7 +6143,7 @@
             <a:fld id="{208313BE-D12C-455C-A881-17A0D46B2F62}" type="datetimeFigureOut">
               <a:rPr lang="zh-CN" altLang="en-US" smtClean="0"/>
               <a:pPr/>
-              <a:t>2019/10/31</a:t>
+              <a:t>2019/12/22</a:t>
             </a:fld>
             <a:endParaRPr lang="zh-CN" altLang="en-US" dirty="0"/>
           </a:p>
@@ -6000,7 +6252,7 @@
             <a:fld id="{208313BE-D12C-455C-A881-17A0D46B2F62}" type="datetimeFigureOut">
               <a:rPr lang="zh-CN" altLang="en-US" smtClean="0"/>
               <a:pPr/>
-              <a:t>2019/10/31</a:t>
+              <a:t>2019/12/22</a:t>
             </a:fld>
             <a:endParaRPr lang="zh-CN" altLang="en-US" dirty="0"/>
           </a:p>
@@ -6289,7 +6541,7 @@
             <a:fld id="{208313BE-D12C-455C-A881-17A0D46B2F62}" type="datetimeFigureOut">
               <a:rPr lang="zh-CN" altLang="en-US" smtClean="0"/>
               <a:pPr/>
-              <a:t>2019/10/31</a:t>
+              <a:t>2019/12/22</a:t>
             </a:fld>
             <a:endParaRPr lang="zh-CN" altLang="en-US" dirty="0"/>
           </a:p>
@@ -6537,7 +6789,7 @@
             <a:fld id="{66A7A40B-EA42-4A59-BDB5-85EFA65BC5FC}" type="datetimeFigureOut">
               <a:rPr lang="zh-CN" altLang="en-US" smtClean="0"/>
               <a:pPr/>
-              <a:t>2019/10/31</a:t>
+              <a:t>2019/12/22</a:t>
             </a:fld>
             <a:endParaRPr lang="zh-CN" altLang="en-US" dirty="0"/>
           </a:p>
@@ -6851,7 +7103,7 @@
             <a:fld id="{208313BE-D12C-455C-A881-17A0D46B2F62}" type="datetimeFigureOut">
               <a:rPr lang="zh-CN" altLang="en-US" smtClean="0"/>
               <a:pPr/>
-              <a:t>2019/10/31</a:t>
+              <a:t>2019/12/22</a:t>
             </a:fld>
             <a:endParaRPr lang="zh-CN" altLang="en-US" dirty="0"/>
           </a:p>
@@ -7053,7 +7305,7 @@
             <a:fld id="{208313BE-D12C-455C-A881-17A0D46B2F62}" type="datetimeFigureOut">
               <a:rPr lang="zh-CN" altLang="en-US" smtClean="0"/>
               <a:pPr/>
-              <a:t>2019/10/31</a:t>
+              <a:t>2019/12/22</a:t>
             </a:fld>
             <a:endParaRPr lang="zh-CN" altLang="en-US" dirty="0"/>
           </a:p>
@@ -7265,7 +7517,7 @@
             <a:fld id="{208313BE-D12C-455C-A881-17A0D46B2F62}" type="datetimeFigureOut">
               <a:rPr lang="zh-CN" altLang="en-US" smtClean="0"/>
               <a:pPr/>
-              <a:t>2019/10/31</a:t>
+              <a:t>2019/12/22</a:t>
             </a:fld>
             <a:endParaRPr lang="zh-CN" altLang="en-US" dirty="0"/>
           </a:p>
@@ -7524,7 +7776,7 @@
             <a:fld id="{66A7A40B-EA42-4A59-BDB5-85EFA65BC5FC}" type="datetimeFigureOut">
               <a:rPr lang="zh-CN" altLang="en-US" smtClean="0"/>
               <a:pPr/>
-              <a:t>2019/10/31</a:t>
+              <a:t>2019/12/22</a:t>
             </a:fld>
             <a:endParaRPr lang="zh-CN" altLang="en-US" dirty="0"/>
           </a:p>
@@ -7875,7 +8127,7 @@
             <a:fld id="{66A7A40B-EA42-4A59-BDB5-85EFA65BC5FC}" type="datetimeFigureOut">
               <a:rPr lang="zh-CN" altLang="en-US" smtClean="0"/>
               <a:pPr/>
-              <a:t>2019/10/31</a:t>
+              <a:t>2019/12/22</a:t>
             </a:fld>
             <a:endParaRPr lang="zh-CN" altLang="en-US" dirty="0"/>
           </a:p>
@@ -8308,7 +8560,7 @@
             <a:fld id="{66A7A40B-EA42-4A59-BDB5-85EFA65BC5FC}" type="datetimeFigureOut">
               <a:rPr lang="zh-CN" altLang="en-US" smtClean="0"/>
               <a:pPr/>
-              <a:t>2019/10/31</a:t>
+              <a:t>2019/12/22</a:t>
             </a:fld>
             <a:endParaRPr lang="zh-CN" altLang="en-US" dirty="0"/>
           </a:p>
@@ -8443,7 +8695,7 @@
             <a:fld id="{66A7A40B-EA42-4A59-BDB5-85EFA65BC5FC}" type="datetimeFigureOut">
               <a:rPr lang="zh-CN" altLang="en-US" smtClean="0"/>
               <a:pPr/>
-              <a:t>2019/10/31</a:t>
+              <a:t>2019/12/22</a:t>
             </a:fld>
             <a:endParaRPr lang="zh-CN" altLang="en-US" dirty="0"/>
           </a:p>
@@ -8552,7 +8804,7 @@
             <a:fld id="{66A7A40B-EA42-4A59-BDB5-85EFA65BC5FC}" type="datetimeFigureOut">
               <a:rPr lang="zh-CN" altLang="en-US" smtClean="0"/>
               <a:pPr/>
-              <a:t>2019/10/31</a:t>
+              <a:t>2019/12/22</a:t>
             </a:fld>
             <a:endParaRPr lang="zh-CN" altLang="en-US" dirty="0"/>
           </a:p>
@@ -8841,7 +9093,7 @@
             <a:fld id="{66A7A40B-EA42-4A59-BDB5-85EFA65BC5FC}" type="datetimeFigureOut">
               <a:rPr lang="zh-CN" altLang="en-US" smtClean="0"/>
               <a:pPr/>
-              <a:t>2019/10/31</a:t>
+              <a:t>2019/12/22</a:t>
             </a:fld>
             <a:endParaRPr lang="zh-CN" altLang="en-US" dirty="0"/>
           </a:p>
@@ -9110,7 +9362,7 @@
             <a:fld id="{66A7A40B-EA42-4A59-BDB5-85EFA65BC5FC}" type="datetimeFigureOut">
               <a:rPr lang="zh-CN" altLang="en-US" smtClean="0"/>
               <a:pPr/>
-              <a:t>2019/10/31</a:t>
+              <a:t>2019/12/22</a:t>
             </a:fld>
             <a:endParaRPr lang="zh-CN" altLang="en-US" dirty="0"/>
           </a:p>
@@ -9334,7 +9586,7 @@
             <a:fld id="{66A7A40B-EA42-4A59-BDB5-85EFA65BC5FC}" type="datetimeFigureOut">
               <a:rPr lang="zh-CN" altLang="en-US" smtClean="0"/>
               <a:pPr/>
-              <a:t>2019/10/31</a:t>
+              <a:t>2019/12/22</a:t>
             </a:fld>
             <a:endParaRPr lang="zh-CN" altLang="en-US" dirty="0"/>
           </a:p>
@@ -9887,7 +10139,7 @@
             <a:fld id="{208313BE-D12C-455C-A881-17A0D46B2F62}" type="datetimeFigureOut">
               <a:rPr lang="zh-CN" altLang="en-US" smtClean="0"/>
               <a:pPr/>
-              <a:t>2019/10/31</a:t>
+              <a:t>2019/12/22</a:t>
             </a:fld>
             <a:endParaRPr lang="zh-CN" altLang="en-US" dirty="0"/>
           </a:p>
@@ -10630,7 +10882,7 @@
           <a:noFill/>
           <a:extLst>
             <a:ext uri="{909E8E84-426E-40dd-AFC4-6F175D3DCCD1}">
-              <a14:hiddenFill xmlns:a14="http://schemas.microsoft.com/office/drawing/2010/main" xmlns="">
+              <a14:hiddenFill xmlns="" xmlns:a14="http://schemas.microsoft.com/office/drawing/2010/main">
                 <a:solidFill>
                   <a:srgbClr val="FFFFFF"/>
                 </a:solidFill>
@@ -12280,14 +12532,14 @@
           <a:ln/>
           <a:extLst>
             <a:ext uri="{909E8E84-426E-40dd-AFC4-6F175D3DCCD1}">
-              <a14:hiddenFill xmlns:a14="http://schemas.microsoft.com/office/drawing/2010/main" xmlns="">
+              <a14:hiddenFill xmlns="" xmlns:a14="http://schemas.microsoft.com/office/drawing/2010/main">
                 <a:solidFill>
                   <a:srgbClr val="FFFFFF"/>
                 </a:solidFill>
               </a14:hiddenFill>
             </a:ext>
             <a:ext uri="{91240B29-F687-4f45-9708-019B960494DF}">
-              <a14:hiddenLine xmlns:a14="http://schemas.microsoft.com/office/drawing/2010/main" xmlns="" w="9525">
+              <a14:hiddenLine xmlns="" xmlns:a14="http://schemas.microsoft.com/office/drawing/2010/main" w="9525">
                 <a:solidFill>
                   <a:srgbClr val="000000"/>
                 </a:solidFill>
@@ -12702,14 +12954,14 @@
           <a:ln/>
           <a:extLst>
             <a:ext uri="{909E8E84-426E-40dd-AFC4-6F175D3DCCD1}">
-              <a14:hiddenFill xmlns:a14="http://schemas.microsoft.com/office/drawing/2010/main" xmlns="">
+              <a14:hiddenFill xmlns="" xmlns:a14="http://schemas.microsoft.com/office/drawing/2010/main">
                 <a:solidFill>
                   <a:srgbClr val="FFFFFF"/>
                 </a:solidFill>
               </a14:hiddenFill>
             </a:ext>
             <a:ext uri="{91240B29-F687-4f45-9708-019B960494DF}">
-              <a14:hiddenLine xmlns:a14="http://schemas.microsoft.com/office/drawing/2010/main" xmlns="" w="9525">
+              <a14:hiddenLine xmlns="" xmlns:a14="http://schemas.microsoft.com/office/drawing/2010/main" w="9525">
                 <a:solidFill>
                   <a:srgbClr val="000000"/>
                 </a:solidFill>
@@ -12935,14 +13187,14 @@
           <a:ln/>
           <a:extLst>
             <a:ext uri="{909E8E84-426E-40dd-AFC4-6F175D3DCCD1}">
-              <a14:hiddenFill xmlns:a14="http://schemas.microsoft.com/office/drawing/2010/main" xmlns="">
+              <a14:hiddenFill xmlns="" xmlns:a14="http://schemas.microsoft.com/office/drawing/2010/main">
                 <a:solidFill>
                   <a:srgbClr val="FFFFFF"/>
                 </a:solidFill>
               </a14:hiddenFill>
             </a:ext>
             <a:ext uri="{91240B29-F687-4f45-9708-019B960494DF}">
-              <a14:hiddenLine xmlns:a14="http://schemas.microsoft.com/office/drawing/2010/main" xmlns="" w="9525">
+              <a14:hiddenLine xmlns="" xmlns:a14="http://schemas.microsoft.com/office/drawing/2010/main" w="9525">
                 <a:solidFill>
                   <a:srgbClr val="000000"/>
                 </a:solidFill>
@@ -13126,14 +13378,14 @@
           </a:ln>
           <a:extLst>
             <a:ext uri="{909E8E84-426E-40dd-AFC4-6F175D3DCCD1}">
-              <a14:hiddenFill xmlns:a14="http://schemas.microsoft.com/office/drawing/2010/main" xmlns="">
+              <a14:hiddenFill xmlns="" xmlns:a14="http://schemas.microsoft.com/office/drawing/2010/main">
                 <a:solidFill>
                   <a:srgbClr val="FFFFFF"/>
                 </a:solidFill>
               </a14:hiddenFill>
             </a:ext>
             <a:ext uri="{91240B29-F687-4f45-9708-019B960494DF}">
-              <a14:hiddenLine xmlns:a14="http://schemas.microsoft.com/office/drawing/2010/main" xmlns="" w="9525">
+              <a14:hiddenLine xmlns="" xmlns:a14="http://schemas.microsoft.com/office/drawing/2010/main" w="9525">
                 <a:solidFill>
                   <a:srgbClr val="000000"/>
                 </a:solidFill>
@@ -13406,7 +13658,7 @@
           </a:ln>
           <a:extLst>
             <a:ext uri="{909E8E84-426E-40dd-AFC4-6F175D3DCCD1}">
-              <a14:hiddenFill xmlns:a14="http://schemas.microsoft.com/office/drawing/2010/main" xmlns="">
+              <a14:hiddenFill xmlns="" xmlns:a14="http://schemas.microsoft.com/office/drawing/2010/main">
                 <a:solidFill>
                   <a:srgbClr val="FFFFFF"/>
                 </a:solidFill>
@@ -19359,7 +19611,12 @@
             <p:ph type="title"/>
           </p:nvPr>
         </p:nvSpPr>
-        <p:spPr/>
+        <p:spPr>
+          <a:xfrm>
+            <a:off x="457200" y="228866"/>
+            <a:ext cx="8229600" cy="900442"/>
+          </a:xfrm>
+        </p:spPr>
         <p:txBody>
           <a:bodyPr/>
           <a:lstStyle/>
@@ -19386,7 +19643,12 @@
             <p:ph idx="1"/>
           </p:nvPr>
         </p:nvSpPr>
-        <p:spPr/>
+        <p:spPr>
+          <a:xfrm>
+            <a:off x="457200" y="1333501"/>
+            <a:ext cx="8229600" cy="3771636"/>
+          </a:xfrm>
+        </p:spPr>
         <p:txBody>
           <a:bodyPr>
             <a:normAutofit fontScale="85000" lnSpcReduction="10000"/>
@@ -21044,25 +21306,7 @@
                 <a:cs typeface="+mn-ea"/>
                 <a:sym typeface="+mn-lt"/>
               </a:rPr>
-              <a:t>(b) – </a:t>
-            </a:r>
-            <a:r>
-              <a:rPr lang="en-US" altLang="zh-CN" sz="1800" dirty="0" err="1">
-                <a:latin typeface="Consolas" panose="020B0609020204030204" pitchFamily="49" charset="0"/>
-                <a:ea typeface="Baskerville" panose="02020502070401020303" pitchFamily="18" charset="0"/>
-                <a:cs typeface="+mn-ea"/>
-                <a:sym typeface="+mn-lt"/>
-              </a:rPr>
-              <a:t>amt</a:t>
-            </a:r>
-            <a:r>
-              <a:rPr lang="en-US" altLang="zh-CN" sz="1800" dirty="0">
-                <a:latin typeface="Consolas" panose="020B0609020204030204" pitchFamily="49" charset="0"/>
-                <a:ea typeface="Baskerville" panose="02020502070401020303" pitchFamily="18" charset="0"/>
-                <a:cs typeface="+mn-ea"/>
-                <a:sym typeface="+mn-lt"/>
-              </a:rPr>
-              <a:t>)</a:t>
+              <a:t>(b) + amt)</a:t>
             </a:r>
             <a:endParaRPr lang="en-US" sz="1800" dirty="0">
               <a:latin typeface="Consolas" panose="020B0609020204030204" pitchFamily="49" charset="0"/>
@@ -41498,7 +41742,7 @@
                 <a:cs typeface="+mn-ea"/>
                 <a:sym typeface="+mn-lt"/>
               </a:rPr>
-              <a:t>Current log grows without bound: not practical</a:t>
+              <a:t>Current log grows without bound not practical</a:t>
             </a:r>
           </a:p>
           <a:p>

</xml_diff>